<commit_message>
Improve Spelling and add to pres
</commit_message>
<xml_diff>
--- a/EPQ – Artefact.pptx
+++ b/EPQ – Artefact.pptx
@@ -20,6 +20,7 @@
     <p:sldId id="269" r:id="rId14"/>
     <p:sldId id="270" r:id="rId15"/>
     <p:sldId id="264" r:id="rId16"/>
+    <p:sldId id="271" r:id="rId17"/>
   </p:sldIdLst>
   <p:sldSz cx="9144000" cy="6858000" type="screen4x3"/>
   <p:notesSz cx="6858000" cy="9144000"/>
@@ -302,7 +303,7 @@
           <a:p>
             <a:fld id="{63C9F0FD-CE4B-4738-8555-11F3AAAD7E90}" type="datetimeFigureOut">
               <a:rPr lang="en-GB" smtClean="0"/>
-              <a:t>01/03/2018</a:t>
+              <a:t>08/03/2018</a:t>
             </a:fld>
             <a:endParaRPr lang="en-GB"/>
           </a:p>
@@ -472,7 +473,7 @@
           <a:p>
             <a:fld id="{63C9F0FD-CE4B-4738-8555-11F3AAAD7E90}" type="datetimeFigureOut">
               <a:rPr lang="en-GB" smtClean="0"/>
-              <a:t>01/03/2018</a:t>
+              <a:t>08/03/2018</a:t>
             </a:fld>
             <a:endParaRPr lang="en-GB"/>
           </a:p>
@@ -652,7 +653,7 @@
           <a:p>
             <a:fld id="{63C9F0FD-CE4B-4738-8555-11F3AAAD7E90}" type="datetimeFigureOut">
               <a:rPr lang="en-GB" smtClean="0"/>
-              <a:t>01/03/2018</a:t>
+              <a:t>08/03/2018</a:t>
             </a:fld>
             <a:endParaRPr lang="en-GB"/>
           </a:p>
@@ -822,7 +823,7 @@
           <a:p>
             <a:fld id="{63C9F0FD-CE4B-4738-8555-11F3AAAD7E90}" type="datetimeFigureOut">
               <a:rPr lang="en-GB" smtClean="0"/>
-              <a:t>01/03/2018</a:t>
+              <a:t>08/03/2018</a:t>
             </a:fld>
             <a:endParaRPr lang="en-GB"/>
           </a:p>
@@ -1068,7 +1069,7 @@
           <a:p>
             <a:fld id="{63C9F0FD-CE4B-4738-8555-11F3AAAD7E90}" type="datetimeFigureOut">
               <a:rPr lang="en-GB" smtClean="0"/>
-              <a:t>01/03/2018</a:t>
+              <a:t>08/03/2018</a:t>
             </a:fld>
             <a:endParaRPr lang="en-GB"/>
           </a:p>
@@ -1356,7 +1357,7 @@
           <a:p>
             <a:fld id="{63C9F0FD-CE4B-4738-8555-11F3AAAD7E90}" type="datetimeFigureOut">
               <a:rPr lang="en-GB" smtClean="0"/>
-              <a:t>01/03/2018</a:t>
+              <a:t>08/03/2018</a:t>
             </a:fld>
             <a:endParaRPr lang="en-GB"/>
           </a:p>
@@ -1778,7 +1779,7 @@
           <a:p>
             <a:fld id="{63C9F0FD-CE4B-4738-8555-11F3AAAD7E90}" type="datetimeFigureOut">
               <a:rPr lang="en-GB" smtClean="0"/>
-              <a:t>01/03/2018</a:t>
+              <a:t>08/03/2018</a:t>
             </a:fld>
             <a:endParaRPr lang="en-GB"/>
           </a:p>
@@ -1896,7 +1897,7 @@
           <a:p>
             <a:fld id="{63C9F0FD-CE4B-4738-8555-11F3AAAD7E90}" type="datetimeFigureOut">
               <a:rPr lang="en-GB" smtClean="0"/>
-              <a:t>01/03/2018</a:t>
+              <a:t>08/03/2018</a:t>
             </a:fld>
             <a:endParaRPr lang="en-GB"/>
           </a:p>
@@ -1991,7 +1992,7 @@
           <a:p>
             <a:fld id="{63C9F0FD-CE4B-4738-8555-11F3AAAD7E90}" type="datetimeFigureOut">
               <a:rPr lang="en-GB" smtClean="0"/>
-              <a:t>01/03/2018</a:t>
+              <a:t>08/03/2018</a:t>
             </a:fld>
             <a:endParaRPr lang="en-GB"/>
           </a:p>
@@ -2268,7 +2269,7 @@
           <a:p>
             <a:fld id="{63C9F0FD-CE4B-4738-8555-11F3AAAD7E90}" type="datetimeFigureOut">
               <a:rPr lang="en-GB" smtClean="0"/>
-              <a:t>01/03/2018</a:t>
+              <a:t>08/03/2018</a:t>
             </a:fld>
             <a:endParaRPr lang="en-GB"/>
           </a:p>
@@ -2521,7 +2522,7 @@
           <a:p>
             <a:fld id="{63C9F0FD-CE4B-4738-8555-11F3AAAD7E90}" type="datetimeFigureOut">
               <a:rPr lang="en-GB" smtClean="0"/>
-              <a:t>01/03/2018</a:t>
+              <a:t>08/03/2018</a:t>
             </a:fld>
             <a:endParaRPr lang="en-GB"/>
           </a:p>
@@ -2734,7 +2735,7 @@
           <a:p>
             <a:fld id="{63C9F0FD-CE4B-4738-8555-11F3AAAD7E90}" type="datetimeFigureOut">
               <a:rPr lang="en-GB" smtClean="0"/>
-              <a:t>01/03/2018</a:t>
+              <a:t>08/03/2018</a:t>
             </a:fld>
             <a:endParaRPr lang="en-GB"/>
           </a:p>
@@ -3396,6 +3397,134 @@
           </a:p>
         </p:txBody>
       </p:sp>
+      <p:pic>
+        <p:nvPicPr>
+          <p:cNvPr id="1027" name="Picture 3"/>
+          <p:cNvPicPr>
+            <a:picLocks noChangeAspect="1" noChangeArrowheads="1"/>
+          </p:cNvPicPr>
+          <p:nvPr/>
+        </p:nvPicPr>
+        <p:blipFill>
+          <a:blip r:embed="rId2">
+            <a:extLst>
+              <a:ext uri="{BEBA8EAE-BF5A-486C-A8C5-ECC9F3942E4B}">
+                <a14:imgProps xmlns:a14="http://schemas.microsoft.com/office/drawing/2010/main">
+                  <a14:imgLayer r:embed="rId3">
+                    <a14:imgEffect>
+                      <a14:backgroundRemoval t="10000" b="90000" l="10000" r="90000"/>
+                    </a14:imgEffect>
+                  </a14:imgLayer>
+                </a14:imgProps>
+              </a:ext>
+              <a:ext uri="{28A0092B-C50C-407E-A947-70E740481C1C}">
+                <a14:useLocalDpi xmlns:a14="http://schemas.microsoft.com/office/drawing/2010/main" val="0"/>
+              </a:ext>
+            </a:extLst>
+          </a:blip>
+          <a:srcRect/>
+          <a:stretch>
+            <a:fillRect/>
+          </a:stretch>
+        </p:blipFill>
+        <p:spPr bwMode="auto">
+          <a:xfrm>
+            <a:off x="5220072" y="3043849"/>
+            <a:ext cx="3751159" cy="3751159"/>
+          </a:xfrm>
+          <a:prstGeom prst="rect">
+            <a:avLst/>
+          </a:prstGeom>
+          <a:noFill/>
+          <a:ln>
+            <a:noFill/>
+          </a:ln>
+          <a:extLst>
+            <a:ext uri="{909E8E84-426E-40DD-AFC4-6F175D3DCCD1}">
+              <a14:hiddenFill xmlns:a14="http://schemas.microsoft.com/office/drawing/2010/main">
+                <a:solidFill>
+                  <a:schemeClr val="accent1"/>
+                </a:solidFill>
+              </a14:hiddenFill>
+            </a:ext>
+            <a:ext uri="{91240B29-F687-4F45-9708-019B960494DF}">
+              <a14:hiddenLine xmlns:a14="http://schemas.microsoft.com/office/drawing/2010/main" w="9525">
+                <a:solidFill>
+                  <a:schemeClr val="tx1"/>
+                </a:solidFill>
+                <a:miter lim="800000"/>
+                <a:headEnd/>
+                <a:tailEnd/>
+              </a14:hiddenLine>
+            </a:ext>
+          </a:extLst>
+        </p:spPr>
+      </p:pic>
+      <p:pic>
+        <p:nvPicPr>
+          <p:cNvPr id="1028" name="Picture 4"/>
+          <p:cNvPicPr>
+            <a:picLocks noChangeAspect="1" noChangeArrowheads="1"/>
+          </p:cNvPicPr>
+          <p:nvPr/>
+        </p:nvPicPr>
+        <p:blipFill>
+          <a:blip r:embed="rId4">
+            <a:extLst>
+              <a:ext uri="{BEBA8EAE-BF5A-486C-A8C5-ECC9F3942E4B}">
+                <a14:imgProps xmlns:a14="http://schemas.microsoft.com/office/drawing/2010/main">
+                  <a14:imgLayer r:embed="rId5">
+                    <a14:imgEffect>
+                      <a14:backgroundRemoval t="10000" b="90000" l="10000" r="90000">
+                        <a14:foregroundMark x1="52000" y1="42500" x2="26500" y2="43500"/>
+                      </a14:backgroundRemoval>
+                    </a14:imgEffect>
+                  </a14:imgLayer>
+                </a14:imgProps>
+              </a:ext>
+              <a:ext uri="{28A0092B-C50C-407E-A947-70E740481C1C}">
+                <a14:useLocalDpi xmlns:a14="http://schemas.microsoft.com/office/drawing/2010/main" val="0"/>
+              </a:ext>
+            </a:extLst>
+          </a:blip>
+          <a:srcRect/>
+          <a:stretch>
+            <a:fillRect/>
+          </a:stretch>
+        </p:blipFill>
+        <p:spPr bwMode="auto">
+          <a:xfrm>
+            <a:off x="1036115" y="3659288"/>
+            <a:ext cx="2520280" cy="2520280"/>
+          </a:xfrm>
+          <a:prstGeom prst="rect">
+            <a:avLst/>
+          </a:prstGeom>
+          <a:noFill/>
+          <a:ln>
+            <a:noFill/>
+          </a:ln>
+          <a:extLst>
+            <a:ext uri="{909E8E84-426E-40DD-AFC4-6F175D3DCCD1}">
+              <a14:hiddenFill xmlns:a14="http://schemas.microsoft.com/office/drawing/2010/main">
+                <a:solidFill>
+                  <a:schemeClr val="accent1"/>
+                </a:solidFill>
+              </a14:hiddenFill>
+            </a:ext>
+            <a:ext uri="{91240B29-F687-4F45-9708-019B960494DF}">
+              <a14:hiddenLine xmlns:a14="http://schemas.microsoft.com/office/drawing/2010/main" w="9525">
+                <a:solidFill>
+                  <a:schemeClr val="tx1"/>
+                </a:solidFill>
+                <a:miter lim="800000"/>
+                <a:headEnd/>
+                <a:tailEnd/>
+              </a14:hiddenLine>
+            </a:ext>
+          </a:extLst>
+        </p:spPr>
+      </p:pic>
     </p:spTree>
     <p:extLst>
       <p:ext uri="{BB962C8B-B14F-4D97-AF65-F5344CB8AC3E}">
@@ -3491,6 +3620,100 @@
           </a:p>
         </p:txBody>
       </p:sp>
+      <p:pic>
+        <p:nvPicPr>
+          <p:cNvPr id="2050" name="Picture 2"/>
+          <p:cNvPicPr>
+            <a:picLocks noChangeAspect="1" noChangeArrowheads="1"/>
+          </p:cNvPicPr>
+          <p:nvPr/>
+        </p:nvPicPr>
+        <p:blipFill>
+          <a:blip r:embed="rId2">
+            <a:extLst>
+              <a:ext uri="{28A0092B-C50C-407E-A947-70E740481C1C}">
+                <a14:useLocalDpi xmlns:a14="http://schemas.microsoft.com/office/drawing/2010/main" val="0"/>
+              </a:ext>
+            </a:extLst>
+          </a:blip>
+          <a:srcRect/>
+          <a:stretch>
+            <a:fillRect/>
+          </a:stretch>
+        </p:blipFill>
+        <p:spPr bwMode="auto">
+          <a:xfrm>
+            <a:off x="467544" y="3284984"/>
+            <a:ext cx="4926013" cy="3121025"/>
+          </a:xfrm>
+          <a:prstGeom prst="rect">
+            <a:avLst/>
+          </a:prstGeom>
+          <a:noFill/>
+          <a:ln>
+            <a:noFill/>
+          </a:ln>
+          <a:effectLst/>
+          <a:extLst>
+            <a:ext uri="{909E8E84-426E-40DD-AFC4-6F175D3DCCD1}">
+              <a14:hiddenFill xmlns:a14="http://schemas.microsoft.com/office/drawing/2010/main">
+                <a:solidFill>
+                  <a:schemeClr val="accent1"/>
+                </a:solidFill>
+              </a14:hiddenFill>
+            </a:ext>
+            <a:ext uri="{91240B29-F687-4F45-9708-019B960494DF}">
+              <a14:hiddenLine xmlns:a14="http://schemas.microsoft.com/office/drawing/2010/main" w="9525">
+                <a:solidFill>
+                  <a:schemeClr val="tx1"/>
+                </a:solidFill>
+                <a:miter lim="800000"/>
+                <a:headEnd/>
+                <a:tailEnd/>
+              </a14:hiddenLine>
+            </a:ext>
+            <a:ext uri="{AF507438-7753-43E0-B8FC-AC1667EBCBE1}">
+              <a14:hiddenEffects xmlns:a14="http://schemas.microsoft.com/office/drawing/2010/main">
+                <a:effectLst>
+                  <a:outerShdw dist="35921" dir="2700000" algn="ctr" rotWithShape="0">
+                    <a:schemeClr val="bg2"/>
+                  </a:outerShdw>
+                </a:effectLst>
+              </a14:hiddenEffects>
+            </a:ext>
+          </a:extLst>
+        </p:spPr>
+      </p:pic>
+      <p:pic>
+        <p:nvPicPr>
+          <p:cNvPr id="4" name="Picture 3"/>
+          <p:cNvPicPr>
+            <a:picLocks noChangeAspect="1"/>
+          </p:cNvPicPr>
+          <p:nvPr/>
+        </p:nvPicPr>
+        <p:blipFill>
+          <a:blip r:embed="rId3">
+            <a:extLst>
+              <a:ext uri="{28A0092B-C50C-407E-A947-70E740481C1C}">
+                <a14:useLocalDpi xmlns:a14="http://schemas.microsoft.com/office/drawing/2010/main" val="0"/>
+              </a:ext>
+            </a:extLst>
+          </a:blip>
+          <a:stretch>
+            <a:fillRect/>
+          </a:stretch>
+        </p:blipFill>
+        <p:spPr>
+          <a:xfrm>
+            <a:off x="4716016" y="1196752"/>
+            <a:ext cx="3521968" cy="1937082"/>
+          </a:xfrm>
+          <a:prstGeom prst="rect">
+            <a:avLst/>
+          </a:prstGeom>
+        </p:spPr>
+      </p:pic>
     </p:spTree>
     <p:extLst>
       <p:ext uri="{BB962C8B-B14F-4D97-AF65-F5344CB8AC3E}">
@@ -3603,6 +3826,66 @@
           </a:p>
         </p:txBody>
       </p:sp>
+      <p:pic>
+        <p:nvPicPr>
+          <p:cNvPr id="4" name="Picture 3"/>
+          <p:cNvPicPr>
+            <a:picLocks noChangeAspect="1"/>
+          </p:cNvPicPr>
+          <p:nvPr/>
+        </p:nvPicPr>
+        <p:blipFill>
+          <a:blip r:embed="rId2">
+            <a:extLst>
+              <a:ext uri="{28A0092B-C50C-407E-A947-70E740481C1C}">
+                <a14:useLocalDpi xmlns:a14="http://schemas.microsoft.com/office/drawing/2010/main" val="0"/>
+              </a:ext>
+            </a:extLst>
+          </a:blip>
+          <a:stretch>
+            <a:fillRect/>
+          </a:stretch>
+        </p:blipFill>
+        <p:spPr>
+          <a:xfrm>
+            <a:off x="611560" y="3975007"/>
+            <a:ext cx="2386698" cy="2386698"/>
+          </a:xfrm>
+          <a:prstGeom prst="rect">
+            <a:avLst/>
+          </a:prstGeom>
+        </p:spPr>
+      </p:pic>
+      <p:pic>
+        <p:nvPicPr>
+          <p:cNvPr id="5" name="Picture 4"/>
+          <p:cNvPicPr>
+            <a:picLocks noChangeAspect="1"/>
+          </p:cNvPicPr>
+          <p:nvPr/>
+        </p:nvPicPr>
+        <p:blipFill>
+          <a:blip r:embed="rId3" cstate="print">
+            <a:extLst>
+              <a:ext uri="{28A0092B-C50C-407E-A947-70E740481C1C}">
+                <a14:useLocalDpi xmlns:a14="http://schemas.microsoft.com/office/drawing/2010/main" val="0"/>
+              </a:ext>
+            </a:extLst>
+          </a:blip>
+          <a:stretch>
+            <a:fillRect/>
+          </a:stretch>
+        </p:blipFill>
+        <p:spPr>
+          <a:xfrm>
+            <a:off x="4330824" y="3429000"/>
+            <a:ext cx="2457967" cy="3151981"/>
+          </a:xfrm>
+          <a:prstGeom prst="rect">
+            <a:avLst/>
+          </a:prstGeom>
+        </p:spPr>
+      </p:pic>
     </p:spTree>
     <p:extLst>
       <p:ext uri="{BB962C8B-B14F-4D97-AF65-F5344CB8AC3E}">
@@ -3971,12 +4254,20 @@
             <a:pPr lvl="2"/>
             <a:r>
               <a:rPr lang="en-GB" dirty="0" smtClean="0"/>
-              <a:t>This could be improve without </a:t>
-            </a:r>
-            <a:r>
-              <a:rPr lang="en-GB" smtClean="0"/>
-              <a:t>time constraints</a:t>
-            </a:r>
+              <a:t>This could be improve without time </a:t>
+            </a:r>
+            <a:r>
+              <a:rPr lang="en-GB" dirty="0" smtClean="0"/>
+              <a:t>constraints</a:t>
+            </a:r>
+          </a:p>
+          <a:p>
+            <a:pPr lvl="2"/>
+            <a:r>
+              <a:rPr lang="en-GB" dirty="0" smtClean="0"/>
+              <a:t>Could have ported the interface to a bot so many users could interact with it</a:t>
+            </a:r>
+            <a:endParaRPr lang="en-GB" dirty="0" smtClean="0"/>
           </a:p>
           <a:p>
             <a:endParaRPr lang="en-GB" dirty="0" smtClean="0"/>
@@ -3990,6 +4281,88 @@
     <p:extLst>
       <p:ext uri="{BB962C8B-B14F-4D97-AF65-F5344CB8AC3E}">
         <p14:creationId xmlns:p14="http://schemas.microsoft.com/office/powerpoint/2010/main" val="3318732334"/>
+      </p:ext>
+    </p:extLst>
+  </p:cSld>
+  <p:clrMapOvr>
+    <a:masterClrMapping/>
+  </p:clrMapOvr>
+</p:sld>
+</file>
+
+<file path=ppt/slides/slide16.xml><?xml version="1.0" encoding="utf-8"?>
+<p:sld xmlns:a="http://schemas.openxmlformats.org/drawingml/2006/main" xmlns:r="http://schemas.openxmlformats.org/officeDocument/2006/relationships" xmlns:p="http://schemas.openxmlformats.org/presentationml/2006/main">
+  <p:cSld>
+    <p:spTree>
+      <p:nvGrpSpPr>
+        <p:cNvPr id="1" name=""/>
+        <p:cNvGrpSpPr/>
+        <p:nvPr/>
+      </p:nvGrpSpPr>
+      <p:grpSpPr>
+        <a:xfrm>
+          <a:off x="0" y="0"/>
+          <a:ext cx="0" cy="0"/>
+          <a:chOff x="0" y="0"/>
+          <a:chExt cx="0" cy="0"/>
+        </a:xfrm>
+      </p:grpSpPr>
+      <p:sp>
+        <p:nvSpPr>
+          <p:cNvPr id="2" name="Title 1"/>
+          <p:cNvSpPr>
+            <a:spLocks noGrp="1"/>
+          </p:cNvSpPr>
+          <p:nvPr>
+            <p:ph type="title"/>
+          </p:nvPr>
+        </p:nvSpPr>
+        <p:spPr/>
+        <p:txBody>
+          <a:bodyPr/>
+          <a:lstStyle/>
+          <a:p>
+            <a:r>
+              <a:rPr lang="en-GB" dirty="0" smtClean="0"/>
+              <a:t>What I’ve Learnt</a:t>
+            </a:r>
+            <a:endParaRPr lang="en-GB" dirty="0"/>
+          </a:p>
+        </p:txBody>
+      </p:sp>
+      <p:sp>
+        <p:nvSpPr>
+          <p:cNvPr id="3" name="Content Placeholder 2"/>
+          <p:cNvSpPr>
+            <a:spLocks noGrp="1"/>
+          </p:cNvSpPr>
+          <p:nvPr>
+            <p:ph idx="1"/>
+          </p:nvPr>
+        </p:nvSpPr>
+        <p:spPr/>
+        <p:txBody>
+          <a:bodyPr/>
+          <a:lstStyle/>
+          <a:p>
+            <a:r>
+              <a:rPr lang="en-GB" dirty="0" smtClean="0"/>
+              <a:t>Learnt about different electronic components and how </a:t>
+            </a:r>
+            <a:r>
+              <a:rPr lang="en-GB" smtClean="0"/>
+              <a:t>they work</a:t>
+            </a:r>
+          </a:p>
+          <a:p>
+            <a:endParaRPr lang="en-GB" dirty="0"/>
+          </a:p>
+        </p:txBody>
+      </p:sp>
+    </p:spTree>
+    <p:extLst>
+      <p:ext uri="{BB962C8B-B14F-4D97-AF65-F5344CB8AC3E}">
+        <p14:creationId xmlns:p14="http://schemas.microsoft.com/office/powerpoint/2010/main" val="3827266548"/>
       </p:ext>
     </p:extLst>
   </p:cSld>

</xml_diff>